<commit_message>
change objective to operation and homo topology
</commit_message>
<xml_diff>
--- a/data/topology/Topology_Grafik.pptx
+++ b/data/topology/Topology_Grafik.pptx
@@ -6,15 +6,16 @@
     <p:sldMasterId id="2147483793" r:id="rId2"/>
   </p:sldMasterIdLst>
   <p:notesMasterIdLst>
-    <p:notesMasterId r:id="rId6"/>
+    <p:notesMasterId r:id="rId7"/>
   </p:notesMasterIdLst>
   <p:handoutMasterIdLst>
-    <p:handoutMasterId r:id="rId7"/>
+    <p:handoutMasterId r:id="rId8"/>
   </p:handoutMasterIdLst>
   <p:sldIdLst>
     <p:sldId id="300" r:id="rId3"/>
-    <p:sldId id="304" r:id="rId4"/>
-    <p:sldId id="302" r:id="rId5"/>
+    <p:sldId id="305" r:id="rId4"/>
+    <p:sldId id="304" r:id="rId5"/>
+    <p:sldId id="302" r:id="rId6"/>
   </p:sldIdLst>
   <p:sldSz cx="12192000" cy="6858000"/>
   <p:notesSz cx="6797675" cy="9856788"/>
@@ -149,6 +150,7 @@
         <p14:section name="Standardabschnitt" id="{5CF9A5BE-0A61-4133-AC4C-F6277CB66B22}">
           <p14:sldIdLst>
             <p14:sldId id="300"/>
+            <p14:sldId id="305"/>
             <p14:sldId id="304"/>
           </p14:sldIdLst>
         </p14:section>
@@ -349,7 +351,7 @@
               <a:pPr>
                 <a:defRPr/>
               </a:pPr>
-              <a:t>24.09.2021</a:t>
+              <a:t>05.10.2021</a:t>
             </a:fld>
             <a:endParaRPr lang="de-DE" sz="1000" dirty="0">
               <a:latin typeface="Arial" pitchFamily="34" charset="0"/>
@@ -578,7 +580,7 @@
               <a:pPr>
                 <a:defRPr/>
               </a:pPr>
-              <a:t>24.09.2021</a:t>
+              <a:t>05.10.2021</a:t>
             </a:fld>
             <a:endParaRPr lang="de-DE" dirty="0"/>
           </a:p>
@@ -12465,6 +12467,726 @@
           <a:chExt cx="0" cy="0"/>
         </a:xfrm>
       </p:grpSpPr>
+      <p:sp>
+        <p:nvSpPr>
+          <p:cNvPr id="2" name="Titel 1"/>
+          <p:cNvSpPr>
+            <a:spLocks noGrp="1"/>
+          </p:cNvSpPr>
+          <p:nvPr>
+            <p:ph type="title"/>
+          </p:nvPr>
+        </p:nvSpPr>
+        <p:spPr/>
+        <p:txBody>
+          <a:bodyPr/>
+          <a:lstStyle/>
+          <a:p>
+            <a:r>
+              <a:rPr lang="de-DE" dirty="0" smtClean="0"/>
+              <a:t>Homo</a:t>
+            </a:r>
+            <a:endParaRPr lang="de-DE" dirty="0"/>
+          </a:p>
+        </p:txBody>
+      </p:sp>
+      <p:cxnSp>
+        <p:nvCxnSpPr>
+          <p:cNvPr id="6" name="Gerader Verbinder 5"/>
+          <p:cNvCxnSpPr/>
+          <p:nvPr/>
+        </p:nvCxnSpPr>
+        <p:spPr>
+          <a:xfrm>
+            <a:off x="2609850" y="2184962"/>
+            <a:ext cx="1783041" cy="0"/>
+          </a:xfrm>
+          <a:prstGeom prst="line">
+            <a:avLst/>
+          </a:prstGeom>
+          <a:ln w="76200">
+            <a:solidFill>
+              <a:srgbClr val="DEA900"/>
+            </a:solidFill>
+          </a:ln>
+        </p:spPr>
+        <p:style>
+          <a:lnRef idx="1">
+            <a:schemeClr val="accent1"/>
+          </a:lnRef>
+          <a:fillRef idx="0">
+            <a:schemeClr val="accent1"/>
+          </a:fillRef>
+          <a:effectRef idx="0">
+            <a:schemeClr val="accent1"/>
+          </a:effectRef>
+          <a:fontRef idx="minor">
+            <a:schemeClr val="tx1"/>
+          </a:fontRef>
+        </p:style>
+      </p:cxnSp>
+      <p:sp>
+        <p:nvSpPr>
+          <p:cNvPr id="8" name="Textfeld 7"/>
+          <p:cNvSpPr txBox="1"/>
+          <p:nvPr/>
+        </p:nvSpPr>
+        <p:spPr>
+          <a:xfrm>
+            <a:off x="8286948" y="2093235"/>
+            <a:ext cx="685994" cy="128499"/>
+          </a:xfrm>
+          <a:prstGeom prst="rect">
+            <a:avLst/>
+          </a:prstGeom>
+          <a:noFill/>
+        </p:spPr>
+        <p:txBody>
+          <a:bodyPr wrap="none" lIns="0" tIns="0" rIns="0" bIns="0" rtlCol="0">
+            <a:spAutoFit/>
+          </a:bodyPr>
+          <a:lstStyle/>
+          <a:p>
+            <a:r>
+              <a:rPr lang="de-DE" sz="800" b="1" dirty="0"/>
+              <a:t>Wärmebedarf</a:t>
+            </a:r>
+          </a:p>
+        </p:txBody>
+      </p:sp>
+      <p:cxnSp>
+        <p:nvCxnSpPr>
+          <p:cNvPr id="11" name="Gerader Verbinder 10"/>
+          <p:cNvCxnSpPr/>
+          <p:nvPr/>
+        </p:nvCxnSpPr>
+        <p:spPr>
+          <a:xfrm>
+            <a:off x="2507365" y="4758296"/>
+            <a:ext cx="5364095" cy="0"/>
+          </a:xfrm>
+          <a:prstGeom prst="line">
+            <a:avLst/>
+          </a:prstGeom>
+          <a:ln w="76200">
+            <a:solidFill>
+              <a:srgbClr val="168213"/>
+            </a:solidFill>
+          </a:ln>
+        </p:spPr>
+        <p:style>
+          <a:lnRef idx="1">
+            <a:schemeClr val="accent1"/>
+          </a:lnRef>
+          <a:fillRef idx="0">
+            <a:schemeClr val="accent1"/>
+          </a:fillRef>
+          <a:effectRef idx="0">
+            <a:schemeClr val="accent1"/>
+          </a:effectRef>
+          <a:fontRef idx="minor">
+            <a:schemeClr val="tx1"/>
+          </a:fontRef>
+        </p:style>
+      </p:cxnSp>
+      <p:sp>
+        <p:nvSpPr>
+          <p:cNvPr id="47" name="Textfeld 46"/>
+          <p:cNvSpPr txBox="1"/>
+          <p:nvPr/>
+        </p:nvSpPr>
+        <p:spPr>
+          <a:xfrm>
+            <a:off x="3876468" y="1555709"/>
+            <a:ext cx="348017" cy="256996"/>
+          </a:xfrm>
+          <a:prstGeom prst="rect">
+            <a:avLst/>
+          </a:prstGeom>
+          <a:noFill/>
+        </p:spPr>
+        <p:txBody>
+          <a:bodyPr wrap="none" lIns="0" tIns="0" rIns="0" bIns="0" rtlCol="0">
+            <a:spAutoFit/>
+          </a:bodyPr>
+          <a:lstStyle/>
+          <a:p>
+            <a:r>
+              <a:rPr lang="de-DE" sz="800" b="1" dirty="0"/>
+              <a:t>Gas</a:t>
+            </a:r>
+          </a:p>
+          <a:p>
+            <a:r>
+              <a:rPr lang="de-DE" sz="800" b="1" dirty="0"/>
+              <a:t>Kessel</a:t>
+            </a:r>
+          </a:p>
+        </p:txBody>
+      </p:sp>
+      <p:sp>
+        <p:nvSpPr>
+          <p:cNvPr id="53" name="Textfeld 52"/>
+          <p:cNvSpPr txBox="1"/>
+          <p:nvPr/>
+        </p:nvSpPr>
+        <p:spPr>
+          <a:xfrm>
+            <a:off x="2166837" y="1614702"/>
+            <a:ext cx="578913" cy="128499"/>
+          </a:xfrm>
+          <a:prstGeom prst="rect">
+            <a:avLst/>
+          </a:prstGeom>
+          <a:noFill/>
+        </p:spPr>
+        <p:txBody>
+          <a:bodyPr wrap="none" lIns="0" tIns="0" rIns="0" bIns="0" rtlCol="0">
+            <a:spAutoFit/>
+          </a:bodyPr>
+          <a:lstStyle/>
+          <a:p>
+            <a:pPr algn="r"/>
+            <a:r>
+              <a:rPr lang="de-DE" sz="800" b="1" dirty="0"/>
+              <a:t>Erdgasnetz</a:t>
+            </a:r>
+          </a:p>
+        </p:txBody>
+      </p:sp>
+      <p:sp>
+        <p:nvSpPr>
+          <p:cNvPr id="54" name="Textfeld 53"/>
+          <p:cNvSpPr txBox="1"/>
+          <p:nvPr/>
+        </p:nvSpPr>
+        <p:spPr>
+          <a:xfrm>
+            <a:off x="2222052" y="4178810"/>
+            <a:ext cx="523698" cy="128499"/>
+          </a:xfrm>
+          <a:prstGeom prst="rect">
+            <a:avLst/>
+          </a:prstGeom>
+          <a:noFill/>
+        </p:spPr>
+        <p:txBody>
+          <a:bodyPr wrap="none" lIns="0" tIns="0" rIns="0" bIns="0" rtlCol="0">
+            <a:spAutoFit/>
+          </a:bodyPr>
+          <a:lstStyle/>
+          <a:p>
+            <a:pPr algn="r"/>
+            <a:r>
+              <a:rPr lang="de-DE" sz="800" b="1" dirty="0"/>
+              <a:t>Stromnetz</a:t>
+            </a:r>
+          </a:p>
+        </p:txBody>
+      </p:sp>
+      <p:sp>
+        <p:nvSpPr>
+          <p:cNvPr id="61" name="Textfeld 60"/>
+          <p:cNvSpPr txBox="1"/>
+          <p:nvPr/>
+        </p:nvSpPr>
+        <p:spPr>
+          <a:xfrm>
+            <a:off x="8286948" y="4664515"/>
+            <a:ext cx="637473" cy="128499"/>
+          </a:xfrm>
+          <a:prstGeom prst="rect">
+            <a:avLst/>
+          </a:prstGeom>
+          <a:noFill/>
+        </p:spPr>
+        <p:txBody>
+          <a:bodyPr wrap="none" lIns="0" tIns="0" rIns="0" bIns="0" rtlCol="0">
+            <a:spAutoFit/>
+          </a:bodyPr>
+          <a:lstStyle/>
+          <a:p>
+            <a:r>
+              <a:rPr lang="de-DE" sz="800" b="1" dirty="0"/>
+              <a:t>Strombedarf</a:t>
+            </a:r>
+          </a:p>
+        </p:txBody>
+      </p:sp>
+      <p:sp>
+        <p:nvSpPr>
+          <p:cNvPr id="62" name="Textfeld 61"/>
+          <p:cNvSpPr txBox="1"/>
+          <p:nvPr/>
+        </p:nvSpPr>
+        <p:spPr>
+          <a:xfrm>
+            <a:off x="6396241" y="1748480"/>
+            <a:ext cx="673261" cy="123111"/>
+          </a:xfrm>
+          <a:prstGeom prst="rect">
+            <a:avLst/>
+          </a:prstGeom>
+          <a:noFill/>
+        </p:spPr>
+        <p:txBody>
+          <a:bodyPr wrap="none" lIns="0" tIns="0" rIns="0" bIns="0" rtlCol="0">
+            <a:spAutoFit/>
+          </a:bodyPr>
+          <a:lstStyle/>
+          <a:p>
+            <a:r>
+              <a:rPr lang="de-DE" sz="800" b="1" dirty="0" err="1" smtClean="0"/>
+              <a:t>HomoStorage</a:t>
+            </a:r>
+            <a:endParaRPr lang="de-DE" sz="800" b="1" dirty="0"/>
+          </a:p>
+        </p:txBody>
+      </p:sp>
+      <p:sp>
+        <p:nvSpPr>
+          <p:cNvPr id="131" name="Gleichschenkliges Dreieck 130"/>
+          <p:cNvSpPr/>
+          <p:nvPr/>
+        </p:nvSpPr>
+        <p:spPr>
+          <a:xfrm rot="5400000">
+            <a:off x="3156962" y="2144594"/>
+            <a:ext cx="243920" cy="80737"/>
+          </a:xfrm>
+          <a:prstGeom prst="triangle">
+            <a:avLst/>
+          </a:prstGeom>
+          <a:solidFill>
+            <a:srgbClr val="DEA900"/>
+          </a:solidFill>
+          <a:ln>
+            <a:solidFill>
+              <a:schemeClr val="bg1"/>
+            </a:solidFill>
+          </a:ln>
+        </p:spPr>
+        <p:style>
+          <a:lnRef idx="2">
+            <a:schemeClr val="accent1">
+              <a:shade val="50000"/>
+            </a:schemeClr>
+          </a:lnRef>
+          <a:fillRef idx="1">
+            <a:schemeClr val="accent1"/>
+          </a:fillRef>
+          <a:effectRef idx="0">
+            <a:schemeClr val="accent1"/>
+          </a:effectRef>
+          <a:fontRef idx="minor">
+            <a:schemeClr val="lt1"/>
+          </a:fontRef>
+        </p:style>
+        <p:txBody>
+          <a:bodyPr rtlCol="0" anchor="ctr"/>
+          <a:lstStyle/>
+          <a:p>
+            <a:pPr algn="ctr"/>
+            <a:endParaRPr lang="de-DE"/>
+          </a:p>
+        </p:txBody>
+      </p:sp>
+      <p:cxnSp>
+        <p:nvCxnSpPr>
+          <p:cNvPr id="95" name="Gerader Verbinder 94"/>
+          <p:cNvCxnSpPr/>
+          <p:nvPr/>
+        </p:nvCxnSpPr>
+        <p:spPr>
+          <a:xfrm>
+            <a:off x="4392891" y="2184962"/>
+            <a:ext cx="3478569" cy="0"/>
+          </a:xfrm>
+          <a:prstGeom prst="line">
+            <a:avLst/>
+          </a:prstGeom>
+          <a:ln w="76200">
+            <a:solidFill>
+              <a:srgbClr val="C00000"/>
+            </a:solidFill>
+          </a:ln>
+        </p:spPr>
+        <p:style>
+          <a:lnRef idx="1">
+            <a:schemeClr val="accent1"/>
+          </a:lnRef>
+          <a:fillRef idx="0">
+            <a:schemeClr val="accent1"/>
+          </a:fillRef>
+          <a:effectRef idx="0">
+            <a:schemeClr val="accent1"/>
+          </a:effectRef>
+          <a:fontRef idx="minor">
+            <a:schemeClr val="tx1"/>
+          </a:fontRef>
+        </p:style>
+      </p:cxnSp>
+      <p:sp>
+        <p:nvSpPr>
+          <p:cNvPr id="97" name="Gleichschenkliges Dreieck 96"/>
+          <p:cNvSpPr/>
+          <p:nvPr/>
+        </p:nvSpPr>
+        <p:spPr>
+          <a:xfrm rot="16200000" flipV="1">
+            <a:off x="7222210" y="2144594"/>
+            <a:ext cx="243920" cy="80737"/>
+          </a:xfrm>
+          <a:prstGeom prst="triangle">
+            <a:avLst/>
+          </a:prstGeom>
+          <a:solidFill>
+            <a:srgbClr val="C00000"/>
+          </a:solidFill>
+          <a:ln>
+            <a:solidFill>
+              <a:schemeClr val="bg1"/>
+            </a:solidFill>
+          </a:ln>
+        </p:spPr>
+        <p:style>
+          <a:lnRef idx="2">
+            <a:schemeClr val="accent1">
+              <a:shade val="50000"/>
+            </a:schemeClr>
+          </a:lnRef>
+          <a:fillRef idx="1">
+            <a:schemeClr val="accent1"/>
+          </a:fillRef>
+          <a:effectRef idx="0">
+            <a:schemeClr val="accent1"/>
+          </a:effectRef>
+          <a:fontRef idx="minor">
+            <a:schemeClr val="lt1"/>
+          </a:fontRef>
+        </p:style>
+        <p:txBody>
+          <a:bodyPr rtlCol="0" anchor="ctr"/>
+          <a:lstStyle/>
+          <a:p>
+            <a:pPr algn="ctr"/>
+            <a:endParaRPr lang="de-DE"/>
+          </a:p>
+        </p:txBody>
+      </p:sp>
+      <p:pic>
+        <p:nvPicPr>
+          <p:cNvPr id="100" name="Grafik 99"/>
+          <p:cNvPicPr>
+            <a:picLocks noChangeAspect="1"/>
+          </p:cNvPicPr>
+          <p:nvPr/>
+        </p:nvPicPr>
+        <p:blipFill>
+          <a:blip r:embed="rId2">
+            <a:extLst>
+              <a:ext uri="{28A0092B-C50C-407E-A947-70E740481C1C}">
+                <a14:useLocalDpi xmlns:a14="http://schemas.microsoft.com/office/drawing/2010/main" val="0"/>
+              </a:ext>
+            </a:extLst>
+          </a:blip>
+          <a:stretch>
+            <a:fillRect/>
+          </a:stretch>
+        </p:blipFill>
+        <p:spPr>
+          <a:xfrm>
+            <a:off x="7614281" y="4473252"/>
+            <a:ext cx="532730" cy="511027"/>
+          </a:xfrm>
+          <a:prstGeom prst="rect">
+            <a:avLst/>
+          </a:prstGeom>
+        </p:spPr>
+      </p:pic>
+      <p:pic>
+        <p:nvPicPr>
+          <p:cNvPr id="101" name="Grafik 100"/>
+          <p:cNvPicPr>
+            <a:picLocks noChangeAspect="1"/>
+          </p:cNvPicPr>
+          <p:nvPr/>
+        </p:nvPicPr>
+        <p:blipFill>
+          <a:blip r:embed="rId3">
+            <a:extLst>
+              <a:ext uri="{28A0092B-C50C-407E-A947-70E740481C1C}">
+                <a14:useLocalDpi xmlns:a14="http://schemas.microsoft.com/office/drawing/2010/main" val="0"/>
+              </a:ext>
+            </a:extLst>
+          </a:blip>
+          <a:stretch>
+            <a:fillRect/>
+          </a:stretch>
+        </p:blipFill>
+        <p:spPr>
+          <a:xfrm>
+            <a:off x="7614281" y="1901972"/>
+            <a:ext cx="532730" cy="511027"/>
+          </a:xfrm>
+          <a:prstGeom prst="rect">
+            <a:avLst/>
+          </a:prstGeom>
+        </p:spPr>
+      </p:pic>
+      <p:pic>
+        <p:nvPicPr>
+          <p:cNvPr id="102" name="Grafik 101"/>
+          <p:cNvPicPr>
+            <a:picLocks noChangeAspect="1"/>
+          </p:cNvPicPr>
+          <p:nvPr/>
+        </p:nvPicPr>
+        <p:blipFill>
+          <a:blip r:embed="rId4">
+            <a:extLst>
+              <a:ext uri="{28A0092B-C50C-407E-A947-70E740481C1C}">
+                <a14:useLocalDpi xmlns:a14="http://schemas.microsoft.com/office/drawing/2010/main" val="0"/>
+              </a:ext>
+            </a:extLst>
+          </a:blip>
+          <a:stretch>
+            <a:fillRect/>
+          </a:stretch>
+        </p:blipFill>
+        <p:spPr>
+          <a:xfrm>
+            <a:off x="5823188" y="1929449"/>
+            <a:ext cx="532730" cy="511027"/>
+          </a:xfrm>
+          <a:prstGeom prst="rect">
+            <a:avLst/>
+          </a:prstGeom>
+        </p:spPr>
+      </p:pic>
+      <p:pic>
+        <p:nvPicPr>
+          <p:cNvPr id="105" name="Grafik 104"/>
+          <p:cNvPicPr>
+            <a:picLocks noChangeAspect="1"/>
+          </p:cNvPicPr>
+          <p:nvPr/>
+        </p:nvPicPr>
+        <p:blipFill>
+          <a:blip r:embed="rId5">
+            <a:extLst>
+              <a:ext uri="{28A0092B-C50C-407E-A947-70E740481C1C}">
+                <a14:useLocalDpi xmlns:a14="http://schemas.microsoft.com/office/drawing/2010/main" val="0"/>
+              </a:ext>
+            </a:extLst>
+          </a:blip>
+          <a:stretch>
+            <a:fillRect/>
+          </a:stretch>
+        </p:blipFill>
+        <p:spPr>
+          <a:xfrm>
+            <a:off x="2241000" y="1929449"/>
+            <a:ext cx="532730" cy="511027"/>
+          </a:xfrm>
+          <a:prstGeom prst="rect">
+            <a:avLst/>
+          </a:prstGeom>
+        </p:spPr>
+      </p:pic>
+      <p:pic>
+        <p:nvPicPr>
+          <p:cNvPr id="106" name="Grafik 105"/>
+          <p:cNvPicPr>
+            <a:picLocks noChangeAspect="1"/>
+          </p:cNvPicPr>
+          <p:nvPr/>
+        </p:nvPicPr>
+        <p:blipFill>
+          <a:blip r:embed="rId6">
+            <a:extLst>
+              <a:ext uri="{28A0092B-C50C-407E-A947-70E740481C1C}">
+                <a14:useLocalDpi xmlns:a14="http://schemas.microsoft.com/office/drawing/2010/main" val="0"/>
+              </a:ext>
+            </a:extLst>
+          </a:blip>
+          <a:stretch>
+            <a:fillRect/>
+          </a:stretch>
+        </p:blipFill>
+        <p:spPr>
+          <a:xfrm>
+            <a:off x="2241000" y="4473252"/>
+            <a:ext cx="532730" cy="511027"/>
+          </a:xfrm>
+          <a:prstGeom prst="rect">
+            <a:avLst/>
+          </a:prstGeom>
+        </p:spPr>
+      </p:pic>
+      <p:pic>
+        <p:nvPicPr>
+          <p:cNvPr id="112" name="Grafik 111"/>
+          <p:cNvPicPr>
+            <a:picLocks noChangeAspect="1"/>
+          </p:cNvPicPr>
+          <p:nvPr/>
+        </p:nvPicPr>
+        <p:blipFill>
+          <a:blip r:embed="rId7">
+            <a:extLst>
+              <a:ext uri="{28A0092B-C50C-407E-A947-70E740481C1C}">
+                <a14:useLocalDpi xmlns:a14="http://schemas.microsoft.com/office/drawing/2010/main" val="0"/>
+              </a:ext>
+            </a:extLst>
+          </a:blip>
+          <a:stretch>
+            <a:fillRect/>
+          </a:stretch>
+        </p:blipFill>
+        <p:spPr>
+          <a:xfrm>
+            <a:off x="4032094" y="1929449"/>
+            <a:ext cx="532730" cy="511027"/>
+          </a:xfrm>
+          <a:prstGeom prst="rect">
+            <a:avLst/>
+          </a:prstGeom>
+        </p:spPr>
+      </p:pic>
+      <p:sp>
+        <p:nvSpPr>
+          <p:cNvPr id="188" name="Gleichschenkliges Dreieck 187"/>
+          <p:cNvSpPr/>
+          <p:nvPr/>
+        </p:nvSpPr>
+        <p:spPr>
+          <a:xfrm rot="16200000" flipV="1">
+            <a:off x="5205023" y="2144594"/>
+            <a:ext cx="243920" cy="80737"/>
+          </a:xfrm>
+          <a:prstGeom prst="triangle">
+            <a:avLst/>
+          </a:prstGeom>
+          <a:solidFill>
+            <a:srgbClr val="C00000"/>
+          </a:solidFill>
+          <a:ln>
+            <a:solidFill>
+              <a:schemeClr val="bg1"/>
+            </a:solidFill>
+          </a:ln>
+        </p:spPr>
+        <p:style>
+          <a:lnRef idx="2">
+            <a:schemeClr val="accent1">
+              <a:shade val="50000"/>
+            </a:schemeClr>
+          </a:lnRef>
+          <a:fillRef idx="1">
+            <a:schemeClr val="accent1"/>
+          </a:fillRef>
+          <a:effectRef idx="0">
+            <a:schemeClr val="accent1"/>
+          </a:effectRef>
+          <a:fontRef idx="minor">
+            <a:schemeClr val="lt1"/>
+          </a:fontRef>
+        </p:style>
+        <p:txBody>
+          <a:bodyPr rtlCol="0" anchor="ctr"/>
+          <a:lstStyle/>
+          <a:p>
+            <a:pPr algn="ctr"/>
+            <a:endParaRPr lang="de-DE"/>
+          </a:p>
+        </p:txBody>
+      </p:sp>
+      <p:sp>
+        <p:nvSpPr>
+          <p:cNvPr id="56" name="Gleichschenkliges Dreieck 55"/>
+          <p:cNvSpPr/>
+          <p:nvPr/>
+        </p:nvSpPr>
+        <p:spPr>
+          <a:xfrm rot="16200000" flipV="1">
+            <a:off x="5266759" y="4717927"/>
+            <a:ext cx="243920" cy="80737"/>
+          </a:xfrm>
+          <a:prstGeom prst="triangle">
+            <a:avLst/>
+          </a:prstGeom>
+          <a:solidFill>
+            <a:srgbClr val="168213"/>
+          </a:solidFill>
+          <a:ln>
+            <a:solidFill>
+              <a:schemeClr val="bg1"/>
+            </a:solidFill>
+          </a:ln>
+        </p:spPr>
+        <p:style>
+          <a:lnRef idx="2">
+            <a:schemeClr val="accent1">
+              <a:shade val="50000"/>
+            </a:schemeClr>
+          </a:lnRef>
+          <a:fillRef idx="1">
+            <a:schemeClr val="accent1"/>
+          </a:fillRef>
+          <a:effectRef idx="0">
+            <a:schemeClr val="accent1"/>
+          </a:effectRef>
+          <a:fontRef idx="minor">
+            <a:schemeClr val="lt1"/>
+          </a:fontRef>
+        </p:style>
+        <p:txBody>
+          <a:bodyPr rtlCol="0" anchor="ctr"/>
+          <a:lstStyle/>
+          <a:p>
+            <a:pPr algn="ctr"/>
+            <a:endParaRPr lang="de-DE"/>
+          </a:p>
+        </p:txBody>
+      </p:sp>
+    </p:spTree>
+    <p:extLst>
+      <p:ext uri="{BB962C8B-B14F-4D97-AF65-F5344CB8AC3E}">
+        <p14:creationId xmlns:p14="http://schemas.microsoft.com/office/powerpoint/2010/main" val="718862643"/>
+      </p:ext>
+    </p:extLst>
+  </p:cSld>
+  <p:clrMapOvr>
+    <a:masterClrMapping/>
+  </p:clrMapOvr>
+  <p:timing>
+    <p:tnLst>
+      <p:par>
+        <p:cTn id="1" dur="indefinite" restart="never" nodeType="tmRoot"/>
+      </p:par>
+    </p:tnLst>
+  </p:timing>
+</p:sld>
+</file>
+
+<file path=ppt/slides/slide3.xml><?xml version="1.0" encoding="utf-8"?>
+<p:sld xmlns:a="http://schemas.openxmlformats.org/drawingml/2006/main" xmlns:r="http://schemas.openxmlformats.org/officeDocument/2006/relationships" xmlns:p="http://schemas.openxmlformats.org/presentationml/2006/main">
+  <p:cSld>
+    <p:spTree>
+      <p:nvGrpSpPr>
+        <p:cNvPr id="1" name=""/>
+        <p:cNvGrpSpPr/>
+        <p:nvPr/>
+      </p:nvGrpSpPr>
+      <p:grpSpPr>
+        <a:xfrm>
+          <a:off x="0" y="0"/>
+          <a:ext cx="0" cy="0"/>
+          <a:chOff x="0" y="0"/>
+          <a:chExt cx="0" cy="0"/>
+        </a:xfrm>
+      </p:grpSpPr>
       <p:cxnSp>
         <p:nvCxnSpPr>
           <p:cNvPr id="74" name="Gerader Verbinder 73"/>
@@ -14927,7 +15649,7 @@
 </p:sld>
 </file>
 
-<file path=ppt/slides/slide3.xml><?xml version="1.0" encoding="utf-8"?>
+<file path=ppt/slides/slide4.xml><?xml version="1.0" encoding="utf-8"?>
 <p:sld xmlns:a="http://schemas.openxmlformats.org/drawingml/2006/main" xmlns:r="http://schemas.openxmlformats.org/officeDocument/2006/relationships" xmlns:p="http://schemas.openxmlformats.org/presentationml/2006/main">
   <p:cSld>
     <p:spTree>

</xml_diff>